<commit_message>
mapa conceptual matemáticas 9 tema 2
</commit_message>
<xml_diff>
--- a/fuentes/contenidos/grado07/guion02/MapaConceptual.pptx
+++ b/fuentes/contenidos/grado07/guion02/MapaConceptual.pptx
@@ -243,7 +243,7 @@
           <a:p>
             <a:fld id="{C764DE79-268F-4C1A-8933-263129D2AF90}" type="datetimeFigureOut">
               <a:rPr lang="en-US" dirty="0"/>
-              <a:t>8/19/2015</a:t>
+              <a:t>8/21/2015</a:t>
             </a:fld>
             <a:endParaRPr lang="en-US" dirty="0"/>
           </a:p>
@@ -413,7 +413,7 @@
           <a:p>
             <a:fld id="{C764DE79-268F-4C1A-8933-263129D2AF90}" type="datetimeFigureOut">
               <a:rPr lang="en-US" dirty="0"/>
-              <a:t>8/19/2015</a:t>
+              <a:t>8/21/2015</a:t>
             </a:fld>
             <a:endParaRPr lang="en-US" dirty="0"/>
           </a:p>
@@ -593,7 +593,7 @@
           <a:p>
             <a:fld id="{C764DE79-268F-4C1A-8933-263129D2AF90}" type="datetimeFigureOut">
               <a:rPr lang="en-US" dirty="0"/>
-              <a:t>8/19/2015</a:t>
+              <a:t>8/21/2015</a:t>
             </a:fld>
             <a:endParaRPr lang="en-US" dirty="0"/>
           </a:p>
@@ -1059,7 +1059,7 @@
           <a:p>
             <a:fld id="{C764DE79-268F-4C1A-8933-263129D2AF90}" type="datetimeFigureOut">
               <a:rPr lang="en-US" dirty="0"/>
-              <a:t>8/19/2015</a:t>
+              <a:t>8/21/2015</a:t>
             </a:fld>
             <a:endParaRPr lang="en-US" dirty="0"/>
           </a:p>
@@ -1377,7 +1377,7 @@
           <a:p>
             <a:fld id="{C764DE79-268F-4C1A-8933-263129D2AF90}" type="datetimeFigureOut">
               <a:rPr lang="en-US" dirty="0"/>
-              <a:t>8/19/2015</a:t>
+              <a:t>8/21/2015</a:t>
             </a:fld>
             <a:endParaRPr lang="en-US" dirty="0"/>
           </a:p>
@@ -1609,7 +1609,7 @@
           <a:p>
             <a:fld id="{C764DE79-268F-4C1A-8933-263129D2AF90}" type="datetimeFigureOut">
               <a:rPr lang="en-US" dirty="0"/>
-              <a:t>8/19/2015</a:t>
+              <a:t>8/21/2015</a:t>
             </a:fld>
             <a:endParaRPr lang="en-US" dirty="0"/>
           </a:p>
@@ -1976,7 +1976,7 @@
           <a:p>
             <a:fld id="{C764DE79-268F-4C1A-8933-263129D2AF90}" type="datetimeFigureOut">
               <a:rPr lang="en-US" dirty="0"/>
-              <a:t>8/19/2015</a:t>
+              <a:t>8/21/2015</a:t>
             </a:fld>
             <a:endParaRPr lang="en-US" dirty="0"/>
           </a:p>
@@ -2094,7 +2094,7 @@
           <a:p>
             <a:fld id="{C764DE79-268F-4C1A-8933-263129D2AF90}" type="datetimeFigureOut">
               <a:rPr lang="en-US" dirty="0"/>
-              <a:t>8/19/2015</a:t>
+              <a:t>8/21/2015</a:t>
             </a:fld>
             <a:endParaRPr lang="en-US" dirty="0"/>
           </a:p>
@@ -2189,7 +2189,7 @@
           <a:p>
             <a:fld id="{5001C876-01F7-4317-94B9-1AE222133113}" type="datetimeFigureOut">
               <a:rPr lang="es-ES" smtClean="0"/>
-              <a:t>19/08/2015</a:t>
+              <a:t>21/08/2015</a:t>
             </a:fld>
             <a:endParaRPr lang="es-ES"/>
           </a:p>
@@ -2466,7 +2466,7 @@
           <a:p>
             <a:fld id="{C764DE79-268F-4C1A-8933-263129D2AF90}" type="datetimeFigureOut">
               <a:rPr lang="en-US" dirty="0"/>
-              <a:t>8/19/2015</a:t>
+              <a:t>8/21/2015</a:t>
             </a:fld>
             <a:endParaRPr lang="en-US" dirty="0"/>
           </a:p>
@@ -2723,7 +2723,7 @@
           <a:p>
             <a:fld id="{C764DE79-268F-4C1A-8933-263129D2AF90}" type="datetimeFigureOut">
               <a:rPr lang="en-US" dirty="0"/>
-              <a:t>8/19/2015</a:t>
+              <a:t>8/21/2015</a:t>
             </a:fld>
             <a:endParaRPr lang="en-US" dirty="0"/>
           </a:p>
@@ -2936,7 +2936,7 @@
           <a:p>
             <a:fld id="{C764DE79-268F-4C1A-8933-263129D2AF90}" type="datetimeFigureOut">
               <a:rPr lang="en-US" dirty="0"/>
-              <a:t>8/19/2015</a:t>
+              <a:t>8/21/2015</a:t>
             </a:fld>
             <a:endParaRPr lang="en-US" dirty="0"/>
           </a:p>
@@ -3468,7 +3468,7 @@
         </p:nvSpPr>
         <p:spPr>
           <a:xfrm>
-            <a:off x="1162058" y="1053994"/>
+            <a:off x="1017036" y="1054274"/>
             <a:ext cx="1124746" cy="439782"/>
           </a:xfrm>
           <a:prstGeom prst="rect">
@@ -3598,11 +3598,7 @@
             <a:pPr algn="ctr"/>
             <a:r>
               <a:rPr lang="es-ES" sz="900" dirty="0" smtClean="0"/>
-              <a:t>la</a:t>
-            </a:r>
-            <a:r>
-              <a:rPr lang="es-ES" sz="900" dirty="0" smtClean="0"/>
-              <a:t>s básicas son</a:t>
+              <a:t>las básicas son</a:t>
             </a:r>
             <a:endParaRPr lang="es-ES" sz="900" dirty="0"/>
           </a:p>
@@ -3968,11 +3964,6 @@
               </a:rPr>
               <a:t>asociativa</a:t>
             </a:r>
-            <a:endParaRPr lang="es-ES" sz="800" dirty="0" smtClean="0">
-              <a:solidFill>
-                <a:schemeClr val="tx1"/>
-              </a:solidFill>
-            </a:endParaRPr>
           </a:p>
           <a:p>
             <a:pPr marL="171450" indent="-171450">
@@ -4004,15 +3995,7 @@
                   <a:schemeClr val="tx1"/>
                 </a:solidFill>
               </a:rPr>
-              <a:t>opuesto </a:t>
-            </a:r>
-            <a:r>
-              <a:rPr lang="es-ES" sz="800" dirty="0" smtClean="0">
-                <a:solidFill>
-                  <a:schemeClr val="tx1"/>
-                </a:solidFill>
-              </a:rPr>
-              <a:t>aditivo</a:t>
+              <a:t>opuesto aditivo</a:t>
             </a:r>
             <a:endParaRPr lang="es-ES" sz="800" dirty="0">
               <a:solidFill>
@@ -4612,15 +4595,7 @@
                   <a:schemeClr val="tx1"/>
                 </a:solidFill>
               </a:rPr>
-              <a:t>se </a:t>
-            </a:r>
-            <a:r>
-              <a:rPr lang="es-ES" sz="800" dirty="0" smtClean="0">
-                <a:solidFill>
-                  <a:schemeClr val="tx1"/>
-                </a:solidFill>
-              </a:rPr>
-              <a:t>adicionan </a:t>
+              <a:t>se adicionan </a:t>
             </a:r>
             <a:r>
               <a:rPr lang="es-ES" sz="800" dirty="0">
@@ -4823,23 +4798,7 @@
                   <a:schemeClr val="tx1"/>
                 </a:solidFill>
               </a:rPr>
-              <a:t>al </a:t>
-            </a:r>
-            <a:r>
-              <a:rPr lang="es-ES" sz="800" dirty="0" smtClean="0">
-                <a:solidFill>
-                  <a:schemeClr val="tx1"/>
-                </a:solidFill>
-              </a:rPr>
-              <a:t>sustraer dos enteros </a:t>
-            </a:r>
-            <a:r>
-              <a:rPr lang="es-ES" sz="800" dirty="0" smtClean="0">
-                <a:solidFill>
-                  <a:schemeClr val="tx1"/>
-                </a:solidFill>
-              </a:rPr>
-              <a:t>se obtiene un entero</a:t>
+              <a:t>al sustraer dos enteros se obtiene un entero</a:t>
             </a:r>
             <a:endParaRPr lang="es-ES" sz="800" dirty="0">
               <a:solidFill>
@@ -4905,11 +4864,7 @@
             <a:pPr algn="ctr"/>
             <a:r>
               <a:rPr lang="es-ES" sz="800" dirty="0" smtClean="0"/>
-              <a:t>satisface </a:t>
-            </a:r>
-            <a:r>
-              <a:rPr lang="es-ES" sz="800" dirty="0" smtClean="0"/>
-              <a:t>únicamente la</a:t>
+              <a:t>satisface únicamente la</a:t>
             </a:r>
             <a:endParaRPr lang="es-ES" sz="800" dirty="0"/>
           </a:p>
@@ -5104,18 +5059,14 @@
             <a:pPr algn="ctr"/>
             <a:r>
               <a:rPr lang="es-ES" sz="800" dirty="0" smtClean="0"/>
-              <a:t>se </a:t>
-            </a:r>
-            <a:r>
-              <a:rPr lang="es-ES" sz="800" dirty="0" smtClean="0"/>
-              <a:t>escribe</a:t>
+              <a:t>se escribe</a:t>
             </a:r>
             <a:endParaRPr lang="es-ES" sz="800" dirty="0"/>
           </a:p>
         </p:txBody>
       </p:sp>
-      <mc:AlternateContent xmlns:mc="http://schemas.openxmlformats.org/markup-compatibility/2006">
-        <mc:Choice xmlns:a14="http://schemas.microsoft.com/office/drawing/2010/main" Requires="a14">
+      <mc:AlternateContent xmlns:mc="http://schemas.openxmlformats.org/markup-compatibility/2006" xmlns:a14="http://schemas.microsoft.com/office/drawing/2010/main">
+        <mc:Choice Requires="a14">
           <p:sp>
             <p:nvSpPr>
               <p:cNvPr id="242" name="Rectángulo 241" descr="Nodo de segundo nivel" title="Nodo02"/>
@@ -5243,7 +5194,7 @@
             </p:txBody>
           </p:sp>
         </mc:Choice>
-        <mc:Fallback>
+        <mc:Fallback xmlns="">
           <p:sp>
             <p:nvSpPr>
               <p:cNvPr id="242" name="Rectángulo 241" descr="Nodo de segundo nivel" title="Nodo02"/>
@@ -5333,15 +5284,7 @@
             <a:pPr lvl="0" algn="ctr"/>
             <a:r>
               <a:rPr lang="es-CO" sz="800" dirty="0" smtClean="0"/>
-              <a:t>cociente exact</a:t>
-            </a:r>
-            <a:r>
-              <a:rPr lang="es-CO" sz="800" dirty="0" smtClean="0"/>
-              <a:t>o </a:t>
-            </a:r>
-            <a:r>
-              <a:rPr lang="es-CO" sz="800" dirty="0" smtClean="0"/>
-              <a:t>de </a:t>
+              <a:t>cociente exacto de </a:t>
             </a:r>
             <a:r>
               <a:rPr lang="es-CO" sz="800" dirty="0"/>
@@ -5349,11 +5292,7 @@
             </a:r>
             <a:r>
               <a:rPr lang="es-CO" sz="800" dirty="0" smtClean="0"/>
-              <a:t>absolutos de los </a:t>
-            </a:r>
-            <a:r>
-              <a:rPr lang="es-CO" sz="800" dirty="0" smtClean="0"/>
-              <a:t>números</a:t>
+              <a:t>absolutos de los números</a:t>
             </a:r>
             <a:endParaRPr lang="es-CO" sz="800" dirty="0"/>
           </a:p>
@@ -5419,11 +5358,7 @@
             <a:pPr algn="ctr"/>
             <a:r>
               <a:rPr lang="es-ES" sz="800" dirty="0" smtClean="0"/>
-              <a:t>corresponde </a:t>
-            </a:r>
-            <a:r>
-              <a:rPr lang="es-ES" sz="800" dirty="0" smtClean="0"/>
-              <a:t>al</a:t>
+              <a:t>corresponde al</a:t>
             </a:r>
             <a:endParaRPr lang="es-ES" sz="800" dirty="0"/>
           </a:p>

</xml_diff>